<commit_message>
add Apollo v4 docs/presentation for COSMIC meeting 2
</commit_message>
<xml_diff>
--- a/docs/Project Apollo - v06.pptx
+++ b/docs/Project Apollo - v06.pptx
@@ -3662,12 +3662,12 @@
           <a:p>
             <a:pPr lvl="1" fontAlgn="ctr"/>
             <a:r>
-              <a:rPr lang="en-US" dirty="0" err="1"/>
-              <a:t>Oxikit</a:t>
-            </a:r>
-            <a:r>
-              <a:rPr lang="en-US" dirty="0"/>
-              <a:t> </a:t>
+              <a:rPr lang="en-US"/>
+              <a:t>Helpful Engineering, Oxikit</a:t>
+            </a:r>
+            <a:r>
+              <a:rPr lang="en-US" dirty="0"/>
+              <a:t>, Public Invention, Quick2space.org, Microsoft Garage </a:t>
             </a:r>
           </a:p>
           <a:p>

</xml_diff>

<commit_message>
add Apollo v4 docs/presentation for COSMIC meeting 4
</commit_message>
<xml_diff>
--- a/docs/Project Apollo - v06.pptx
+++ b/docs/Project Apollo - v06.pptx
@@ -8,9 +8,10 @@
     <p:sldId id="257" r:id="rId2"/>
     <p:sldId id="258" r:id="rId3"/>
     <p:sldId id="259" r:id="rId4"/>
-    <p:sldId id="261" r:id="rId5"/>
-    <p:sldId id="260" r:id="rId6"/>
-    <p:sldId id="262" r:id="rId7"/>
+    <p:sldId id="263" r:id="rId5"/>
+    <p:sldId id="262" r:id="rId6"/>
+    <p:sldId id="261" r:id="rId7"/>
+    <p:sldId id="260" r:id="rId8"/>
   </p:sldIdLst>
   <p:sldSz cx="12192000" cy="6858000"/>
   <p:notesSz cx="6858000" cy="9144000"/>
@@ -4134,7 +4135,7 @@
           <a:p>
             <a:r>
               <a:rPr lang="en-US" dirty="0"/>
-              <a:t>Prototyping effort</a:t>
+              <a:t>Prototyping effort – electronics, software</a:t>
             </a:r>
           </a:p>
         </p:txBody>
@@ -4328,6 +4329,216 @@
           <p:cNvPr id="5" name="Picture 4">
             <a:extLst>
               <a:ext uri="{FF2B5EF4-FFF2-40B4-BE49-F238E27FC236}">
+                <a16:creationId xmlns:a16="http://schemas.microsoft.com/office/drawing/2014/main" id="{76D2E589-4F13-4833-82CE-524A66F018B7}"/>
+              </a:ext>
+            </a:extLst>
+          </p:cNvPr>
+          <p:cNvPicPr>
+            <a:picLocks noChangeAspect="1"/>
+          </p:cNvPicPr>
+          <p:nvPr/>
+        </p:nvPicPr>
+        <p:blipFill>
+          <a:blip r:embed="rId2"/>
+          <a:stretch>
+            <a:fillRect/>
+          </a:stretch>
+        </p:blipFill>
+        <p:spPr>
+          <a:xfrm>
+            <a:off x="127754" y="75732"/>
+            <a:ext cx="11936491" cy="6706536"/>
+          </a:xfrm>
+          <a:prstGeom prst="rect">
+            <a:avLst/>
+          </a:prstGeom>
+        </p:spPr>
+      </p:pic>
+    </p:spTree>
+    <p:extLst>
+      <p:ext uri="{BB962C8B-B14F-4D97-AF65-F5344CB8AC3E}">
+        <p14:creationId xmlns:p14="http://schemas.microsoft.com/office/powerpoint/2010/main" val="387819970"/>
+      </p:ext>
+    </p:extLst>
+  </p:cSld>
+  <p:clrMapOvr>
+    <a:masterClrMapping/>
+  </p:clrMapOvr>
+</p:sld>
+</file>
+
+<file path=ppt/slides/slide5.xml><?xml version="1.0" encoding="utf-8"?>
+<p:sld xmlns:a="http://schemas.openxmlformats.org/drawingml/2006/main" xmlns:r="http://schemas.openxmlformats.org/officeDocument/2006/relationships" xmlns:p="http://schemas.openxmlformats.org/presentationml/2006/main">
+  <p:cSld>
+    <p:spTree>
+      <p:nvGrpSpPr>
+        <p:cNvPr id="1" name=""/>
+        <p:cNvGrpSpPr/>
+        <p:nvPr/>
+      </p:nvGrpSpPr>
+      <p:grpSpPr>
+        <a:xfrm>
+          <a:off x="0" y="0"/>
+          <a:ext cx="0" cy="0"/>
+          <a:chOff x="0" y="0"/>
+          <a:chExt cx="0" cy="0"/>
+        </a:xfrm>
+      </p:grpSpPr>
+      <p:sp>
+        <p:nvSpPr>
+          <p:cNvPr id="2" name="Title 1">
+            <a:extLst>
+              <a:ext uri="{FF2B5EF4-FFF2-40B4-BE49-F238E27FC236}">
+                <a16:creationId xmlns:a16="http://schemas.microsoft.com/office/drawing/2014/main" id="{3B1597BF-1644-407F-914B-74A56D0A9F33}"/>
+              </a:ext>
+            </a:extLst>
+          </p:cNvPr>
+          <p:cNvSpPr>
+            <a:spLocks noGrp="1"/>
+          </p:cNvSpPr>
+          <p:nvPr>
+            <p:ph type="title"/>
+          </p:nvPr>
+        </p:nvSpPr>
+        <p:spPr/>
+        <p:txBody>
+          <a:bodyPr/>
+          <a:lstStyle/>
+          <a:p>
+            <a:r>
+              <a:rPr lang="en-US" dirty="0"/>
+              <a:t>Conclusion</a:t>
+            </a:r>
+          </a:p>
+        </p:txBody>
+      </p:sp>
+      <p:sp>
+        <p:nvSpPr>
+          <p:cNvPr id="3" name="Content Placeholder 2">
+            <a:extLst>
+              <a:ext uri="{FF2B5EF4-FFF2-40B4-BE49-F238E27FC236}">
+                <a16:creationId xmlns:a16="http://schemas.microsoft.com/office/drawing/2014/main" id="{CA89C165-28F4-4EC1-85B1-62A7AFD73554}"/>
+              </a:ext>
+            </a:extLst>
+          </p:cNvPr>
+          <p:cNvSpPr>
+            <a:spLocks noGrp="1"/>
+          </p:cNvSpPr>
+          <p:nvPr>
+            <p:ph idx="1"/>
+          </p:nvPr>
+        </p:nvSpPr>
+        <p:spPr/>
+        <p:txBody>
+          <a:bodyPr/>
+          <a:lstStyle/>
+          <a:p>
+            <a:r>
+              <a:rPr lang="en-US" dirty="0"/>
+              <a:t>Apollo</a:t>
+            </a:r>
+          </a:p>
+          <a:p>
+            <a:pPr lvl="1"/>
+            <a:r>
+              <a:rPr lang="en-US" dirty="0"/>
+              <a:t>Open source oxygen concentrator with focus on low-cost </a:t>
+            </a:r>
+          </a:p>
+          <a:p>
+            <a:pPr lvl="1"/>
+            <a:r>
+              <a:rPr lang="en-US" dirty="0"/>
+              <a:t>When Apollo v4 comes out we encourage everyone to build one! </a:t>
+            </a:r>
+          </a:p>
+          <a:p>
+            <a:r>
+              <a:rPr lang="en-US" dirty="0"/>
+              <a:t>Please visit us at </a:t>
+            </a:r>
+          </a:p>
+          <a:p>
+            <a:pPr lvl="1"/>
+            <a:r>
+              <a:rPr lang="en-US" dirty="0">
+                <a:hlinkClick r:id="rId2"/>
+              </a:rPr>
+              <a:t>http://project-Apollo.org</a:t>
+            </a:r>
+            <a:r>
+              <a:rPr lang="en-US" dirty="0"/>
+              <a:t> </a:t>
+            </a:r>
+          </a:p>
+          <a:p>
+            <a:pPr lvl="2"/>
+            <a:r>
+              <a:rPr lang="en-US" dirty="0" err="1"/>
+              <a:t>Github</a:t>
+            </a:r>
+            <a:r>
+              <a:rPr lang="en-US" dirty="0"/>
+              <a:t> for designs, PCBs and software</a:t>
+            </a:r>
+          </a:p>
+          <a:p>
+            <a:pPr lvl="1"/>
+            <a:r>
+              <a:rPr lang="en-US" dirty="0">
+                <a:hlinkClick r:id="rId3"/>
+              </a:rPr>
+              <a:t>http://HelpfulEngineering.org</a:t>
+            </a:r>
+            <a:r>
+              <a:rPr lang="en-US" dirty="0"/>
+              <a:t> </a:t>
+            </a:r>
+          </a:p>
+          <a:p>
+            <a:pPr lvl="2"/>
+            <a:r>
+              <a:rPr lang="en-US" dirty="0"/>
+              <a:t>Slack channel = #project-oxygen-concentrator</a:t>
+            </a:r>
+          </a:p>
+        </p:txBody>
+      </p:sp>
+    </p:spTree>
+    <p:extLst>
+      <p:ext uri="{BB962C8B-B14F-4D97-AF65-F5344CB8AC3E}">
+        <p14:creationId xmlns:p14="http://schemas.microsoft.com/office/powerpoint/2010/main" val="3657955472"/>
+      </p:ext>
+    </p:extLst>
+  </p:cSld>
+  <p:clrMapOvr>
+    <a:masterClrMapping/>
+  </p:clrMapOvr>
+</p:sld>
+</file>
+
+<file path=ppt/slides/slide6.xml><?xml version="1.0" encoding="utf-8"?>
+<p:sld xmlns:a="http://schemas.openxmlformats.org/drawingml/2006/main" xmlns:r="http://schemas.openxmlformats.org/officeDocument/2006/relationships" xmlns:p="http://schemas.openxmlformats.org/presentationml/2006/main">
+  <p:cSld>
+    <p:spTree>
+      <p:nvGrpSpPr>
+        <p:cNvPr id="1" name=""/>
+        <p:cNvGrpSpPr/>
+        <p:nvPr/>
+      </p:nvGrpSpPr>
+      <p:grpSpPr>
+        <a:xfrm>
+          <a:off x="0" y="0"/>
+          <a:ext cx="0" cy="0"/>
+          <a:chOff x="0" y="0"/>
+          <a:chExt cx="0" cy="0"/>
+        </a:xfrm>
+      </p:grpSpPr>
+      <p:pic>
+        <p:nvPicPr>
+          <p:cNvPr id="5" name="Picture 4">
+            <a:extLst>
+              <a:ext uri="{FF2B5EF4-FFF2-40B4-BE49-F238E27FC236}">
                 <a16:creationId xmlns:a16="http://schemas.microsoft.com/office/drawing/2014/main" id="{1E16BC0F-F835-4105-890C-0D4F5C58CFC9}"/>
               </a:ext>
             </a:extLst>
@@ -4372,7 +4583,7 @@
 </p:sld>
 </file>
 
-<file path=ppt/slides/slide5.xml><?xml version="1.0" encoding="utf-8"?>
+<file path=ppt/slides/slide7.xml><?xml version="1.0" encoding="utf-8"?>
 <p:sld xmlns:a="http://schemas.openxmlformats.org/drawingml/2006/main" xmlns:r="http://schemas.openxmlformats.org/officeDocument/2006/relationships" xmlns:p="http://schemas.openxmlformats.org/presentationml/2006/main">
   <p:cSld>
     <p:spTree>
@@ -4428,156 +4639,6 @@
     <p:extLst>
       <p:ext uri="{BB962C8B-B14F-4D97-AF65-F5344CB8AC3E}">
         <p14:creationId xmlns:p14="http://schemas.microsoft.com/office/powerpoint/2010/main" val="2072256523"/>
-      </p:ext>
-    </p:extLst>
-  </p:cSld>
-  <p:clrMapOvr>
-    <a:masterClrMapping/>
-  </p:clrMapOvr>
-</p:sld>
-</file>
-
-<file path=ppt/slides/slide6.xml><?xml version="1.0" encoding="utf-8"?>
-<p:sld xmlns:a="http://schemas.openxmlformats.org/drawingml/2006/main" xmlns:r="http://schemas.openxmlformats.org/officeDocument/2006/relationships" xmlns:p="http://schemas.openxmlformats.org/presentationml/2006/main">
-  <p:cSld>
-    <p:spTree>
-      <p:nvGrpSpPr>
-        <p:cNvPr id="1" name=""/>
-        <p:cNvGrpSpPr/>
-        <p:nvPr/>
-      </p:nvGrpSpPr>
-      <p:grpSpPr>
-        <a:xfrm>
-          <a:off x="0" y="0"/>
-          <a:ext cx="0" cy="0"/>
-          <a:chOff x="0" y="0"/>
-          <a:chExt cx="0" cy="0"/>
-        </a:xfrm>
-      </p:grpSpPr>
-      <p:sp>
-        <p:nvSpPr>
-          <p:cNvPr id="2" name="Title 1">
-            <a:extLst>
-              <a:ext uri="{FF2B5EF4-FFF2-40B4-BE49-F238E27FC236}">
-                <a16:creationId xmlns:a16="http://schemas.microsoft.com/office/drawing/2014/main" id="{3B1597BF-1644-407F-914B-74A56D0A9F33}"/>
-              </a:ext>
-            </a:extLst>
-          </p:cNvPr>
-          <p:cNvSpPr>
-            <a:spLocks noGrp="1"/>
-          </p:cNvSpPr>
-          <p:nvPr>
-            <p:ph type="title"/>
-          </p:nvPr>
-        </p:nvSpPr>
-        <p:spPr/>
-        <p:txBody>
-          <a:bodyPr/>
-          <a:lstStyle/>
-          <a:p>
-            <a:r>
-              <a:rPr lang="en-US" dirty="0"/>
-              <a:t>Conclusion</a:t>
-            </a:r>
-          </a:p>
-        </p:txBody>
-      </p:sp>
-      <p:sp>
-        <p:nvSpPr>
-          <p:cNvPr id="3" name="Content Placeholder 2">
-            <a:extLst>
-              <a:ext uri="{FF2B5EF4-FFF2-40B4-BE49-F238E27FC236}">
-                <a16:creationId xmlns:a16="http://schemas.microsoft.com/office/drawing/2014/main" id="{CA89C165-28F4-4EC1-85B1-62A7AFD73554}"/>
-              </a:ext>
-            </a:extLst>
-          </p:cNvPr>
-          <p:cNvSpPr>
-            <a:spLocks noGrp="1"/>
-          </p:cNvSpPr>
-          <p:nvPr>
-            <p:ph idx="1"/>
-          </p:nvPr>
-        </p:nvSpPr>
-        <p:spPr/>
-        <p:txBody>
-          <a:bodyPr/>
-          <a:lstStyle/>
-          <a:p>
-            <a:r>
-              <a:rPr lang="en-US" dirty="0"/>
-              <a:t>Apollo</a:t>
-            </a:r>
-          </a:p>
-          <a:p>
-            <a:pPr lvl="1"/>
-            <a:r>
-              <a:rPr lang="en-US" dirty="0"/>
-              <a:t>Open source oxygen concentrator with focus on low-cost </a:t>
-            </a:r>
-          </a:p>
-          <a:p>
-            <a:pPr lvl="1"/>
-            <a:r>
-              <a:rPr lang="en-US" dirty="0"/>
-              <a:t>When Apollo v4 comes out we encourage everyone to build one! </a:t>
-            </a:r>
-          </a:p>
-          <a:p>
-            <a:r>
-              <a:rPr lang="en-US" dirty="0"/>
-              <a:t>Please visit us at </a:t>
-            </a:r>
-          </a:p>
-          <a:p>
-            <a:pPr lvl="1"/>
-            <a:r>
-              <a:rPr lang="en-US" dirty="0">
-                <a:hlinkClick r:id="rId2"/>
-              </a:rPr>
-              <a:t>http://project-Apollo.org</a:t>
-            </a:r>
-            <a:r>
-              <a:rPr lang="en-US" dirty="0"/>
-              <a:t> </a:t>
-            </a:r>
-          </a:p>
-          <a:p>
-            <a:pPr lvl="2"/>
-            <a:r>
-              <a:rPr lang="en-US" dirty="0" err="1"/>
-              <a:t>Github</a:t>
-            </a:r>
-            <a:r>
-              <a:rPr lang="en-US" dirty="0"/>
-              <a:t> for designs, PCBs and software</a:t>
-            </a:r>
-          </a:p>
-          <a:p>
-            <a:pPr lvl="1"/>
-            <a:r>
-              <a:rPr lang="en-US" dirty="0">
-                <a:hlinkClick r:id="rId3"/>
-              </a:rPr>
-              <a:t>http://HelpfulEngineering.org</a:t>
-            </a:r>
-            <a:r>
-              <a:rPr lang="en-US" dirty="0"/>
-              <a:t> </a:t>
-            </a:r>
-          </a:p>
-          <a:p>
-            <a:pPr lvl="2"/>
-            <a:r>
-              <a:rPr lang="en-US" dirty="0"/>
-              <a:t>Slack channel = #project-oxygen-concentrator</a:t>
-            </a:r>
-          </a:p>
-        </p:txBody>
-      </p:sp>
-    </p:spTree>
-    <p:extLst>
-      <p:ext uri="{BB962C8B-B14F-4D97-AF65-F5344CB8AC3E}">
-        <p14:creationId xmlns:p14="http://schemas.microsoft.com/office/powerpoint/2010/main" val="3657955472"/>
       </p:ext>
     </p:extLst>
   </p:cSld>

</xml_diff>

<commit_message>
add Apollo v4 docs/presentation for COSMIC meeting 5
</commit_message>
<xml_diff>
--- a/docs/Project Apollo - v06.pptx
+++ b/docs/Project Apollo - v06.pptx
@@ -3535,7 +3535,7 @@
             <a:pPr lvl="1" fontAlgn="ctr"/>
             <a:r>
               <a:rPr lang="en-US" dirty="0"/>
-              <a:t>Goal of the Apollo prototype = enabling people around the world to build the prototype as fast as possible</a:t>
+              <a:t>Goal of the Apollo prototype = enabling people around the world to build the prototype ASAP</a:t>
             </a:r>
           </a:p>
           <a:p>
@@ -3663,8 +3663,12 @@
           <a:p>
             <a:pPr lvl="1" fontAlgn="ctr"/>
             <a:r>
-              <a:rPr lang="en-US"/>
-              <a:t>Helpful Engineering, Oxikit</a:t>
+              <a:rPr lang="en-US" dirty="0"/>
+              <a:t>Helpful Engineering, </a:t>
+            </a:r>
+            <a:r>
+              <a:rPr lang="en-US" dirty="0" err="1"/>
+              <a:t>Oxikit</a:t>
             </a:r>
             <a:r>
               <a:rPr lang="en-US" dirty="0"/>
@@ -4045,21 +4049,21 @@
             <a:pPr lvl="1"/>
             <a:r>
               <a:rPr lang="en-US" dirty="0"/>
-              <a:t>Sensor selection</a:t>
+              <a:t>Hardware design</a:t>
             </a:r>
           </a:p>
           <a:p>
             <a:pPr lvl="2"/>
             <a:r>
               <a:rPr lang="en-US" dirty="0"/>
-              <a:t>Sensors for pressure, humidity, temperature – selected and tested</a:t>
+              <a:t>Sensor selection - Sensors for pressure, humidity, temperature – selected and tested</a:t>
             </a:r>
           </a:p>
           <a:p>
             <a:pPr lvl="2"/>
             <a:r>
               <a:rPr lang="en-US" dirty="0"/>
-              <a:t>Valve board – schematic done, PCB in progress</a:t>
+              <a:t>Valve board – schematic in review, PCB in progress</a:t>
             </a:r>
           </a:p>
           <a:p>
@@ -4073,7 +4077,7 @@
             <a:pPr lvl="2"/>
             <a:r>
               <a:rPr lang="en-US" dirty="0"/>
-              <a:t>Sensor board – schematic in progress, PCB in progress (similar with Apollo v3) </a:t>
+              <a:t>Sensor board – schematic in progress, PCB in progress (inspired from Apollo v3) </a:t>
             </a:r>
           </a:p>
           <a:p>

</xml_diff>

<commit_message>
add Apollo v4 docs/presentation for COSMIC meeting 6
</commit_message>
<xml_diff>
--- a/docs/Project Apollo - v06.pptx
+++ b/docs/Project Apollo - v06.pptx
@@ -7,8 +7,8 @@
   <p:sldIdLst>
     <p:sldId id="257" r:id="rId2"/>
     <p:sldId id="258" r:id="rId3"/>
-    <p:sldId id="259" r:id="rId4"/>
-    <p:sldId id="263" r:id="rId5"/>
+    <p:sldId id="263" r:id="rId4"/>
+    <p:sldId id="259" r:id="rId5"/>
     <p:sldId id="262" r:id="rId6"/>
     <p:sldId id="261" r:id="rId7"/>
     <p:sldId id="260" r:id="rId8"/>
@@ -3473,7 +3473,7 @@
         </p:spPr>
         <p:txBody>
           <a:bodyPr>
-            <a:normAutofit fontScale="70000" lnSpcReduction="20000"/>
+            <a:normAutofit fontScale="62500" lnSpcReduction="20000"/>
           </a:bodyPr>
           <a:lstStyle/>
           <a:p>
@@ -3542,14 +3542,21 @@
             <a:pPr lvl="1" fontAlgn="ctr"/>
             <a:r>
               <a:rPr lang="en-US" dirty="0"/>
-              <a:t>Focus = Simplicity and speed of build </a:t>
+              <a:t>Focus = Simplicity and speed of build</a:t>
             </a:r>
           </a:p>
           <a:p>
             <a:pPr lvl="2" fontAlgn="ctr"/>
             <a:r>
               <a:rPr lang="en-US" dirty="0"/>
-              <a:t>Open source, off-the-shelf materials</a:t>
+              <a:t>Simple, reliable design (zeolite-based PSA system)</a:t>
+            </a:r>
+          </a:p>
+          <a:p>
+            <a:pPr lvl="2" fontAlgn="ctr"/>
+            <a:r>
+              <a:rPr lang="en-US" dirty="0"/>
+              <a:t>Flexible, open source, off-the-shelf materials</a:t>
             </a:r>
           </a:p>
           <a:p>
@@ -3664,7 +3671,7 @@
             <a:pPr lvl="1" fontAlgn="ctr"/>
             <a:r>
               <a:rPr lang="en-US" dirty="0"/>
-              <a:t>Helpful Engineering, </a:t>
+              <a:t>Helpful Engineering, Public Invention, </a:t>
             </a:r>
             <a:r>
               <a:rPr lang="en-US" dirty="0" err="1"/>
@@ -3672,7 +3679,7 @@
             </a:r>
             <a:r>
               <a:rPr lang="en-US" dirty="0"/>
-              <a:t>, Public Invention, Quick2space.org, Microsoft Garage </a:t>
+              <a:t>, Microsoft Garage , Quick2space.org</a:t>
             </a:r>
           </a:p>
           <a:p>
@@ -3934,14 +3941,14 @@
         <p:spPr/>
         <p:txBody>
           <a:bodyPr>
-            <a:normAutofit fontScale="62500" lnSpcReduction="20000"/>
+            <a:normAutofit fontScale="55000" lnSpcReduction="20000"/>
           </a:bodyPr>
           <a:lstStyle/>
           <a:p>
             <a:pPr fontAlgn="ctr"/>
             <a:r>
               <a:rPr lang="en-US" dirty="0"/>
-              <a:t>Next version </a:t>
+              <a:t>Next version (Apollo v4) coming soon </a:t>
             </a:r>
           </a:p>
           <a:p>
@@ -3980,6 +3987,20 @@
             </a:r>
           </a:p>
           <a:p>
+            <a:pPr lvl="1" fontAlgn="ctr"/>
+            <a:r>
+              <a:rPr lang="en-US" dirty="0"/>
+              <a:t>Integration with SpO2 oximeter Bluetooth sensors</a:t>
+            </a:r>
+          </a:p>
+          <a:p>
+            <a:pPr lvl="2" fontAlgn="ctr"/>
+            <a:r>
+              <a:rPr lang="en-US" dirty="0"/>
+              <a:t>Pulse mode prototype</a:t>
+            </a:r>
+          </a:p>
+          <a:p>
             <a:r>
               <a:rPr lang="en-US" dirty="0"/>
               <a:t>Status</a:t>
@@ -3989,14 +4010,14 @@
             <a:pPr lvl="1"/>
             <a:r>
               <a:rPr lang="en-US" dirty="0"/>
-              <a:t>Mechanical design</a:t>
+              <a:t>Mechanical design (collaboration with Public Invention) </a:t>
             </a:r>
           </a:p>
           <a:p>
             <a:pPr lvl="2"/>
             <a:r>
               <a:rPr lang="en-US" dirty="0"/>
-              <a:t>Focus on FDA approval and manufacturing</a:t>
+              <a:t>Focus on FDA approval, sourcing deals @ volume and manufacturing</a:t>
             </a:r>
           </a:p>
           <a:p>
@@ -4100,6 +4121,66 @@
 </file>
 
 <file path=ppt/slides/slide3.xml><?xml version="1.0" encoding="utf-8"?>
+<p:sld xmlns:a="http://schemas.openxmlformats.org/drawingml/2006/main" xmlns:r="http://schemas.openxmlformats.org/officeDocument/2006/relationships" xmlns:p="http://schemas.openxmlformats.org/presentationml/2006/main">
+  <p:cSld>
+    <p:spTree>
+      <p:nvGrpSpPr>
+        <p:cNvPr id="1" name=""/>
+        <p:cNvGrpSpPr/>
+        <p:nvPr/>
+      </p:nvGrpSpPr>
+      <p:grpSpPr>
+        <a:xfrm>
+          <a:off x="0" y="0"/>
+          <a:ext cx="0" cy="0"/>
+          <a:chOff x="0" y="0"/>
+          <a:chExt cx="0" cy="0"/>
+        </a:xfrm>
+      </p:grpSpPr>
+      <p:pic>
+        <p:nvPicPr>
+          <p:cNvPr id="5" name="Picture 4">
+            <a:extLst>
+              <a:ext uri="{FF2B5EF4-FFF2-40B4-BE49-F238E27FC236}">
+                <a16:creationId xmlns:a16="http://schemas.microsoft.com/office/drawing/2014/main" id="{76D2E589-4F13-4833-82CE-524A66F018B7}"/>
+              </a:ext>
+            </a:extLst>
+          </p:cNvPr>
+          <p:cNvPicPr>
+            <a:picLocks noChangeAspect="1"/>
+          </p:cNvPicPr>
+          <p:nvPr/>
+        </p:nvPicPr>
+        <p:blipFill>
+          <a:blip r:embed="rId2"/>
+          <a:stretch>
+            <a:fillRect/>
+          </a:stretch>
+        </p:blipFill>
+        <p:spPr>
+          <a:xfrm>
+            <a:off x="127754" y="75732"/>
+            <a:ext cx="11936491" cy="6706536"/>
+          </a:xfrm>
+          <a:prstGeom prst="rect">
+            <a:avLst/>
+          </a:prstGeom>
+        </p:spPr>
+      </p:pic>
+    </p:spTree>
+    <p:extLst>
+      <p:ext uri="{BB962C8B-B14F-4D97-AF65-F5344CB8AC3E}">
+        <p14:creationId xmlns:p14="http://schemas.microsoft.com/office/powerpoint/2010/main" val="387819970"/>
+      </p:ext>
+    </p:extLst>
+  </p:cSld>
+  <p:clrMapOvr>
+    <a:masterClrMapping/>
+  </p:clrMapOvr>
+</p:sld>
+</file>
+
+<file path=ppt/slides/slide4.xml><?xml version="1.0" encoding="utf-8"?>
 <p:sld xmlns:a="http://schemas.openxmlformats.org/drawingml/2006/main" xmlns:r="http://schemas.openxmlformats.org/officeDocument/2006/relationships" xmlns:p="http://schemas.openxmlformats.org/presentationml/2006/main">
   <p:cSld>
     <p:spTree>
@@ -4311,66 +4392,6 @@
 </p:sld>
 </file>
 
-<file path=ppt/slides/slide4.xml><?xml version="1.0" encoding="utf-8"?>
-<p:sld xmlns:a="http://schemas.openxmlformats.org/drawingml/2006/main" xmlns:r="http://schemas.openxmlformats.org/officeDocument/2006/relationships" xmlns:p="http://schemas.openxmlformats.org/presentationml/2006/main">
-  <p:cSld>
-    <p:spTree>
-      <p:nvGrpSpPr>
-        <p:cNvPr id="1" name=""/>
-        <p:cNvGrpSpPr/>
-        <p:nvPr/>
-      </p:nvGrpSpPr>
-      <p:grpSpPr>
-        <a:xfrm>
-          <a:off x="0" y="0"/>
-          <a:ext cx="0" cy="0"/>
-          <a:chOff x="0" y="0"/>
-          <a:chExt cx="0" cy="0"/>
-        </a:xfrm>
-      </p:grpSpPr>
-      <p:pic>
-        <p:nvPicPr>
-          <p:cNvPr id="5" name="Picture 4">
-            <a:extLst>
-              <a:ext uri="{FF2B5EF4-FFF2-40B4-BE49-F238E27FC236}">
-                <a16:creationId xmlns:a16="http://schemas.microsoft.com/office/drawing/2014/main" id="{76D2E589-4F13-4833-82CE-524A66F018B7}"/>
-              </a:ext>
-            </a:extLst>
-          </p:cNvPr>
-          <p:cNvPicPr>
-            <a:picLocks noChangeAspect="1"/>
-          </p:cNvPicPr>
-          <p:nvPr/>
-        </p:nvPicPr>
-        <p:blipFill>
-          <a:blip r:embed="rId2"/>
-          <a:stretch>
-            <a:fillRect/>
-          </a:stretch>
-        </p:blipFill>
-        <p:spPr>
-          <a:xfrm>
-            <a:off x="127754" y="75732"/>
-            <a:ext cx="11936491" cy="6706536"/>
-          </a:xfrm>
-          <a:prstGeom prst="rect">
-            <a:avLst/>
-          </a:prstGeom>
-        </p:spPr>
-      </p:pic>
-    </p:spTree>
-    <p:extLst>
-      <p:ext uri="{BB962C8B-B14F-4D97-AF65-F5344CB8AC3E}">
-        <p14:creationId xmlns:p14="http://schemas.microsoft.com/office/powerpoint/2010/main" val="387819970"/>
-      </p:ext>
-    </p:extLst>
-  </p:cSld>
-  <p:clrMapOvr>
-    <a:masterClrMapping/>
-  </p:clrMapOvr>
-</p:sld>
-</file>
-
 <file path=ppt/slides/slide5.xml><?xml version="1.0" encoding="utf-8"?>
 <p:sld xmlns:a="http://schemas.openxmlformats.org/drawingml/2006/main" xmlns:r="http://schemas.openxmlformats.org/officeDocument/2006/relationships" xmlns:p="http://schemas.openxmlformats.org/presentationml/2006/main">
   <p:cSld>
@@ -4478,6 +4499,10 @@
           <a:p>
             <a:pPr lvl="2"/>
             <a:r>
+              <a:rPr lang="en-US" dirty="0"/>
+              <a:t>Track here our progress on </a:t>
+            </a:r>
+            <a:r>
               <a:rPr lang="en-US" dirty="0" err="1"/>
               <a:t>Github</a:t>
             </a:r>
@@ -4505,6 +4530,31 @@
               <a:rPr lang="en-US" dirty="0"/>
               <a:t>Slack channel = #project-oxygen-concentrator</a:t>
             </a:r>
+          </a:p>
+          <a:p>
+            <a:pPr lvl="1"/>
+            <a:r>
+              <a:rPr lang="en-US" b="0" i="0" u="none" strike="noStrike" dirty="0">
+                <a:effectLst/>
+                <a:latin typeface="Slack-Lato"/>
+                <a:hlinkClick r:id="rId4"/>
+              </a:rPr>
+              <a:t>www.pubinv.org</a:t>
+            </a:r>
+            <a:endParaRPr lang="en-US" b="0" i="0" u="none" strike="noStrike" dirty="0">
+              <a:effectLst/>
+              <a:latin typeface="Slack-Lato"/>
+            </a:endParaRPr>
+          </a:p>
+          <a:p>
+            <a:pPr lvl="2"/>
+            <a:r>
+              <a:rPr lang="en-US" dirty="0">
+                <a:latin typeface="Slack-Lato"/>
+              </a:rPr>
+              <a:t>Public Invention main website </a:t>
+            </a:r>
+            <a:endParaRPr lang="en-US" dirty="0"/>
           </a:p>
         </p:txBody>
       </p:sp>

</xml_diff>